<commit_message>
Added documentation (md and png file) for this workflow.
</commit_message>
<xml_diff>
--- a/designdocs/src/diagrams_source.pptx
+++ b/designdocs/src/diagrams_source.pptx
@@ -13,6 +13,7 @@
     <p:sldId id="261" r:id="rId7"/>
     <p:sldId id="262" r:id="rId8"/>
     <p:sldId id="263" r:id="rId9"/>
+    <p:sldId id="264" r:id="rId10"/>
   </p:sldIdLst>
   <p:sldSz cx="12192000" cy="6858000"/>
   <p:notesSz cx="6858000" cy="9144000"/>
@@ -111,6 +112,11 @@
       </a:defRPr>
     </a:lvl9pPr>
   </p:defaultTextStyle>
+  <p:extLst>
+    <p:ext uri="{EFAFB233-063F-42B5-8137-9DF3F51BA10A}">
+      <p15:sldGuideLst xmlns:p15="http://schemas.microsoft.com/office/powerpoint/2012/main"/>
+    </p:ext>
+  </p:extLst>
 </p:presentation>
 </file>
 
@@ -5800,7 +5806,7 @@
           <a:p>
             <a:fld id="{01FA527B-0574-4E7E-9590-84105F067D6A}" type="datetimeFigureOut">
               <a:rPr lang="en-US" smtClean="0"/>
-              <a:t>04-Dec-18</a:t>
+              <a:t>19-Feb-19</a:t>
             </a:fld>
             <a:endParaRPr lang="en-US"/>
           </a:p>
@@ -5998,7 +6004,7 @@
           <a:p>
             <a:fld id="{01FA527B-0574-4E7E-9590-84105F067D6A}" type="datetimeFigureOut">
               <a:rPr lang="en-US" smtClean="0"/>
-              <a:t>04-Dec-18</a:t>
+              <a:t>19-Feb-19</a:t>
             </a:fld>
             <a:endParaRPr lang="en-US"/>
           </a:p>
@@ -6206,7 +6212,7 @@
           <a:p>
             <a:fld id="{01FA527B-0574-4E7E-9590-84105F067D6A}" type="datetimeFigureOut">
               <a:rPr lang="en-US" smtClean="0"/>
-              <a:t>04-Dec-18</a:t>
+              <a:t>19-Feb-19</a:t>
             </a:fld>
             <a:endParaRPr lang="en-US"/>
           </a:p>
@@ -6404,7 +6410,7 @@
           <a:p>
             <a:fld id="{01FA527B-0574-4E7E-9590-84105F067D6A}" type="datetimeFigureOut">
               <a:rPr lang="en-US" smtClean="0"/>
-              <a:t>04-Dec-18</a:t>
+              <a:t>19-Feb-19</a:t>
             </a:fld>
             <a:endParaRPr lang="en-US"/>
           </a:p>
@@ -6679,7 +6685,7 @@
           <a:p>
             <a:fld id="{01FA527B-0574-4E7E-9590-84105F067D6A}" type="datetimeFigureOut">
               <a:rPr lang="en-US" smtClean="0"/>
-              <a:t>04-Dec-18</a:t>
+              <a:t>19-Feb-19</a:t>
             </a:fld>
             <a:endParaRPr lang="en-US"/>
           </a:p>
@@ -6944,7 +6950,7 @@
           <a:p>
             <a:fld id="{01FA527B-0574-4E7E-9590-84105F067D6A}" type="datetimeFigureOut">
               <a:rPr lang="en-US" smtClean="0"/>
-              <a:t>04-Dec-18</a:t>
+              <a:t>19-Feb-19</a:t>
             </a:fld>
             <a:endParaRPr lang="en-US"/>
           </a:p>
@@ -7356,7 +7362,7 @@
           <a:p>
             <a:fld id="{01FA527B-0574-4E7E-9590-84105F067D6A}" type="datetimeFigureOut">
               <a:rPr lang="en-US" smtClean="0"/>
-              <a:t>04-Dec-18</a:t>
+              <a:t>19-Feb-19</a:t>
             </a:fld>
             <a:endParaRPr lang="en-US"/>
           </a:p>
@@ -7497,7 +7503,7 @@
           <a:p>
             <a:fld id="{01FA527B-0574-4E7E-9590-84105F067D6A}" type="datetimeFigureOut">
               <a:rPr lang="en-US" smtClean="0"/>
-              <a:t>04-Dec-18</a:t>
+              <a:t>19-Feb-19</a:t>
             </a:fld>
             <a:endParaRPr lang="en-US"/>
           </a:p>
@@ -7610,7 +7616,7 @@
           <a:p>
             <a:fld id="{01FA527B-0574-4E7E-9590-84105F067D6A}" type="datetimeFigureOut">
               <a:rPr lang="en-US" smtClean="0"/>
-              <a:t>04-Dec-18</a:t>
+              <a:t>19-Feb-19</a:t>
             </a:fld>
             <a:endParaRPr lang="en-US"/>
           </a:p>
@@ -7921,7 +7927,7 @@
           <a:p>
             <a:fld id="{01FA527B-0574-4E7E-9590-84105F067D6A}" type="datetimeFigureOut">
               <a:rPr lang="en-US" smtClean="0"/>
-              <a:t>04-Dec-18</a:t>
+              <a:t>19-Feb-19</a:t>
             </a:fld>
             <a:endParaRPr lang="en-US"/>
           </a:p>
@@ -8209,7 +8215,7 @@
           <a:p>
             <a:fld id="{01FA527B-0574-4E7E-9590-84105F067D6A}" type="datetimeFigureOut">
               <a:rPr lang="en-US" smtClean="0"/>
-              <a:t>04-Dec-18</a:t>
+              <a:t>19-Feb-19</a:t>
             </a:fld>
             <a:endParaRPr lang="en-US"/>
           </a:p>
@@ -8450,7 +8456,7 @@
           <a:p>
             <a:fld id="{01FA527B-0574-4E7E-9590-84105F067D6A}" type="datetimeFigureOut">
               <a:rPr lang="en-US" smtClean="0"/>
-              <a:t>04-Dec-18</a:t>
+              <a:t>19-Feb-19</a:t>
             </a:fld>
             <a:endParaRPr lang="en-US"/>
           </a:p>
@@ -18453,6 +18459,1661 @@
 </p:sld>
 </file>
 
+<file path=ppt/slides/slide9.xml><?xml version="1.0" encoding="utf-8"?>
+<p:sld xmlns:a="http://schemas.openxmlformats.org/drawingml/2006/main" xmlns:r="http://schemas.openxmlformats.org/officeDocument/2006/relationships" xmlns:p="http://schemas.openxmlformats.org/presentationml/2006/main">
+  <p:cSld>
+    <p:spTree>
+      <p:nvGrpSpPr>
+        <p:cNvPr id="1" name=""/>
+        <p:cNvGrpSpPr/>
+        <p:nvPr/>
+      </p:nvGrpSpPr>
+      <p:grpSpPr>
+        <a:xfrm>
+          <a:off x="0" y="0"/>
+          <a:ext cx="0" cy="0"/>
+          <a:chOff x="0" y="0"/>
+          <a:chExt cx="0" cy="0"/>
+        </a:xfrm>
+      </p:grpSpPr>
+      <p:sp>
+        <p:nvSpPr>
+          <p:cNvPr id="5" name="Rectangle: Rounded Corners 4">
+            <a:extLst>
+              <a:ext uri="{FF2B5EF4-FFF2-40B4-BE49-F238E27FC236}">
+                <a16:creationId xmlns:a16="http://schemas.microsoft.com/office/drawing/2014/main" id="{2AB24A15-775A-49D4-A13E-9F71DD5990E7}"/>
+              </a:ext>
+            </a:extLst>
+          </p:cNvPr>
+          <p:cNvSpPr/>
+          <p:nvPr/>
+        </p:nvSpPr>
+        <p:spPr>
+          <a:xfrm>
+            <a:off x="3251964" y="3493938"/>
+            <a:ext cx="2578193" cy="1546920"/>
+          </a:xfrm>
+          <a:prstGeom prst="roundRect">
+            <a:avLst>
+              <a:gd name="adj" fmla="val 3864"/>
+            </a:avLst>
+          </a:prstGeom>
+        </p:spPr>
+        <p:style>
+          <a:lnRef idx="2">
+            <a:schemeClr val="accent5"/>
+          </a:lnRef>
+          <a:fillRef idx="1">
+            <a:schemeClr val="lt1"/>
+          </a:fillRef>
+          <a:effectRef idx="0">
+            <a:schemeClr val="accent5"/>
+          </a:effectRef>
+          <a:fontRef idx="minor">
+            <a:schemeClr val="dk1"/>
+          </a:fontRef>
+        </p:style>
+        <p:txBody>
+          <a:bodyPr rtlCol="0" anchor="ctr"/>
+          <a:lstStyle/>
+          <a:p>
+            <a:pPr marL="0" marR="0" lvl="0" indent="0" algn="ctr" defTabSz="914400" rtl="0" eaLnBrk="1" fontAlgn="auto" latinLnBrk="0" hangingPunct="1">
+              <a:lnSpc>
+                <a:spcPct val="100000"/>
+              </a:lnSpc>
+              <a:spcBef>
+                <a:spcPts val="0"/>
+              </a:spcBef>
+              <a:spcAft>
+                <a:spcPts val="0"/>
+              </a:spcAft>
+              <a:buClrTx/>
+              <a:buSzTx/>
+              <a:buFontTx/>
+              <a:buNone/>
+              <a:tabLst/>
+              <a:defRPr/>
+            </a:pPr>
+            <a:r>
+              <a:rPr kumimoji="0" lang="en-US" sz="1600" b="1" i="0" u="none" strike="noStrike" kern="1200" cap="none" spc="0" normalizeH="0" baseline="0" noProof="0" dirty="0">
+                <a:ln>
+                  <a:noFill/>
+                </a:ln>
+                <a:solidFill>
+                  <a:srgbClr val="0070C0"/>
+                </a:solidFill>
+                <a:effectLst/>
+                <a:uLnTx/>
+                <a:uFillTx/>
+                <a:latin typeface="Segoe UI" panose="020B0502040204020203" pitchFamily="34" charset="0"/>
+                <a:ea typeface="+mn-ea"/>
+                <a:cs typeface="Segoe UI" panose="020B0502040204020203" pitchFamily="34" charset="0"/>
+              </a:rPr>
+              <a:t>ARM Template</a:t>
+            </a:r>
+          </a:p>
+          <a:p>
+            <a:pPr marL="0" marR="0" lvl="0" indent="0" algn="ctr" defTabSz="914400" rtl="0" eaLnBrk="1" fontAlgn="auto" latinLnBrk="0" hangingPunct="1">
+              <a:lnSpc>
+                <a:spcPct val="100000"/>
+              </a:lnSpc>
+              <a:spcBef>
+                <a:spcPts val="0"/>
+              </a:spcBef>
+              <a:spcAft>
+                <a:spcPts val="0"/>
+              </a:spcAft>
+              <a:buClrTx/>
+              <a:buSzTx/>
+              <a:buFontTx/>
+              <a:buNone/>
+              <a:tabLst/>
+              <a:defRPr/>
+            </a:pPr>
+            <a:endParaRPr kumimoji="0" lang="en-US" sz="1800" b="0" i="0" u="none" strike="noStrike" kern="1200" cap="none" spc="0" normalizeH="0" baseline="0" noProof="0" dirty="0">
+              <a:ln>
+                <a:noFill/>
+              </a:ln>
+              <a:solidFill>
+                <a:prstClr val="black"/>
+              </a:solidFill>
+              <a:effectLst/>
+              <a:uLnTx/>
+              <a:uFillTx/>
+              <a:latin typeface="Segoe UI" panose="020B0502040204020203" pitchFamily="34" charset="0"/>
+              <a:ea typeface="+mn-ea"/>
+              <a:cs typeface="Segoe UI" panose="020B0502040204020203" pitchFamily="34" charset="0"/>
+            </a:endParaRPr>
+          </a:p>
+          <a:p>
+            <a:pPr marL="0" marR="0" lvl="0" indent="0" algn="ctr" defTabSz="914400" rtl="0" eaLnBrk="1" fontAlgn="auto" latinLnBrk="0" hangingPunct="1">
+              <a:lnSpc>
+                <a:spcPct val="100000"/>
+              </a:lnSpc>
+              <a:spcBef>
+                <a:spcPts val="0"/>
+              </a:spcBef>
+              <a:spcAft>
+                <a:spcPts val="0"/>
+              </a:spcAft>
+              <a:buClrTx/>
+              <a:buSzTx/>
+              <a:buFontTx/>
+              <a:buNone/>
+              <a:tabLst/>
+              <a:defRPr/>
+            </a:pPr>
+            <a:r>
+              <a:rPr kumimoji="0" lang="en-US" sz="1400" b="1" i="0" u="none" strike="noStrike" kern="1200" cap="none" spc="0" normalizeH="0" baseline="0" noProof="0" dirty="0" err="1">
+                <a:ln>
+                  <a:noFill/>
+                </a:ln>
+                <a:solidFill>
+                  <a:prstClr val="black"/>
+                </a:solidFill>
+                <a:effectLst/>
+                <a:uLnTx/>
+                <a:uFillTx/>
+                <a:latin typeface="Segoe UI" panose="020B0502040204020203" pitchFamily="34" charset="0"/>
+                <a:ea typeface="+mn-ea"/>
+                <a:cs typeface="Segoe UI" panose="020B0502040204020203" pitchFamily="34" charset="0"/>
+              </a:rPr>
+              <a:t>newstudy.json</a:t>
+            </a:r>
+            <a:endParaRPr kumimoji="0" lang="en-US" sz="1400" b="1" i="0" u="none" strike="noStrike" kern="1200" cap="none" spc="0" normalizeH="0" baseline="0" noProof="0" dirty="0">
+              <a:ln>
+                <a:noFill/>
+              </a:ln>
+              <a:solidFill>
+                <a:prstClr val="black"/>
+              </a:solidFill>
+              <a:effectLst/>
+              <a:uLnTx/>
+              <a:uFillTx/>
+              <a:latin typeface="Segoe UI" panose="020B0502040204020203" pitchFamily="34" charset="0"/>
+              <a:ea typeface="+mn-ea"/>
+              <a:cs typeface="Segoe UI" panose="020B0502040204020203" pitchFamily="34" charset="0"/>
+            </a:endParaRPr>
+          </a:p>
+          <a:p>
+            <a:pPr marL="0" marR="0" lvl="0" indent="0" algn="ctr" defTabSz="914400" rtl="0" eaLnBrk="1" fontAlgn="auto" latinLnBrk="0" hangingPunct="1">
+              <a:lnSpc>
+                <a:spcPct val="100000"/>
+              </a:lnSpc>
+              <a:spcBef>
+                <a:spcPts val="0"/>
+              </a:spcBef>
+              <a:spcAft>
+                <a:spcPts val="0"/>
+              </a:spcAft>
+              <a:buClrTx/>
+              <a:buSzTx/>
+              <a:buFontTx/>
+              <a:buNone/>
+              <a:tabLst/>
+              <a:defRPr/>
+            </a:pPr>
+            <a:endParaRPr kumimoji="0" lang="en-US" sz="1400" b="0" i="0" u="none" strike="noStrike" kern="1200" cap="none" spc="0" normalizeH="0" baseline="0" noProof="0" dirty="0">
+              <a:ln>
+                <a:noFill/>
+              </a:ln>
+              <a:solidFill>
+                <a:prstClr val="black"/>
+              </a:solidFill>
+              <a:effectLst/>
+              <a:uLnTx/>
+              <a:uFillTx/>
+              <a:latin typeface="Segoe UI" panose="020B0502040204020203" pitchFamily="34" charset="0"/>
+              <a:ea typeface="+mn-ea"/>
+              <a:cs typeface="Segoe UI" panose="020B0502040204020203" pitchFamily="34" charset="0"/>
+            </a:endParaRPr>
+          </a:p>
+          <a:p>
+            <a:pPr marL="0" marR="0" lvl="0" indent="0" algn="ctr" defTabSz="914400" rtl="0" eaLnBrk="1" fontAlgn="auto" latinLnBrk="0" hangingPunct="1">
+              <a:lnSpc>
+                <a:spcPct val="100000"/>
+              </a:lnSpc>
+              <a:spcBef>
+                <a:spcPts val="0"/>
+              </a:spcBef>
+              <a:spcAft>
+                <a:spcPts val="0"/>
+              </a:spcAft>
+              <a:buClrTx/>
+              <a:buSzTx/>
+              <a:buFontTx/>
+              <a:buNone/>
+              <a:tabLst/>
+              <a:defRPr/>
+            </a:pPr>
+            <a:r>
+              <a:rPr kumimoji="0" lang="en-US" sz="1400" b="0" i="0" u="none" strike="noStrike" kern="1200" cap="none" spc="0" normalizeH="0" baseline="0" noProof="0" dirty="0">
+                <a:ln>
+                  <a:noFill/>
+                </a:ln>
+                <a:solidFill>
+                  <a:prstClr val="black"/>
+                </a:solidFill>
+                <a:effectLst/>
+                <a:uLnTx/>
+                <a:uFillTx/>
+                <a:latin typeface="Segoe UI" panose="020B0502040204020203" pitchFamily="34" charset="0"/>
+                <a:ea typeface="+mn-ea"/>
+                <a:cs typeface="Segoe UI" panose="020B0502040204020203" pitchFamily="34" charset="0"/>
+              </a:rPr>
+              <a:t>(Creates a RG, storage account)</a:t>
+            </a:r>
+          </a:p>
+        </p:txBody>
+      </p:sp>
+      <p:sp>
+        <p:nvSpPr>
+          <p:cNvPr id="6" name="Rectangle: Rounded Corners 5">
+            <a:extLst>
+              <a:ext uri="{FF2B5EF4-FFF2-40B4-BE49-F238E27FC236}">
+                <a16:creationId xmlns:a16="http://schemas.microsoft.com/office/drawing/2014/main" id="{AE983F0C-73DC-4036-8914-976F9205DDCB}"/>
+              </a:ext>
+            </a:extLst>
+          </p:cNvPr>
+          <p:cNvSpPr/>
+          <p:nvPr/>
+        </p:nvSpPr>
+        <p:spPr>
+          <a:xfrm>
+            <a:off x="3251965" y="1495324"/>
+            <a:ext cx="2578194" cy="1541414"/>
+          </a:xfrm>
+          <a:prstGeom prst="roundRect">
+            <a:avLst>
+              <a:gd name="adj" fmla="val 3864"/>
+            </a:avLst>
+          </a:prstGeom>
+        </p:spPr>
+        <p:style>
+          <a:lnRef idx="2">
+            <a:schemeClr val="accent6"/>
+          </a:lnRef>
+          <a:fillRef idx="1">
+            <a:schemeClr val="lt1"/>
+          </a:fillRef>
+          <a:effectRef idx="0">
+            <a:schemeClr val="accent6"/>
+          </a:effectRef>
+          <a:fontRef idx="minor">
+            <a:schemeClr val="dk1"/>
+          </a:fontRef>
+        </p:style>
+        <p:txBody>
+          <a:bodyPr rtlCol="0" anchor="ctr"/>
+          <a:lstStyle/>
+          <a:p>
+            <a:pPr marL="0" marR="0" lvl="0" indent="0" algn="ctr" defTabSz="914400" rtl="0" eaLnBrk="1" fontAlgn="auto" latinLnBrk="0" hangingPunct="1">
+              <a:lnSpc>
+                <a:spcPct val="100000"/>
+              </a:lnSpc>
+              <a:spcBef>
+                <a:spcPts val="0"/>
+              </a:spcBef>
+              <a:spcAft>
+                <a:spcPts val="0"/>
+              </a:spcAft>
+              <a:buClrTx/>
+              <a:buSzTx/>
+              <a:buFontTx/>
+              <a:buNone/>
+              <a:tabLst/>
+              <a:defRPr/>
+            </a:pPr>
+            <a:r>
+              <a:rPr kumimoji="0" lang="en-US" sz="1600" b="1" i="0" u="none" strike="noStrike" kern="1200" cap="none" spc="0" normalizeH="0" baseline="0" noProof="0" dirty="0">
+                <a:ln>
+                  <a:noFill/>
+                </a:ln>
+                <a:solidFill>
+                  <a:srgbClr val="70AD47"/>
+                </a:solidFill>
+                <a:effectLst/>
+                <a:uLnTx/>
+                <a:uFillTx/>
+                <a:latin typeface="Segoe UI" panose="020B0502040204020203" pitchFamily="34" charset="0"/>
+                <a:ea typeface="+mn-ea"/>
+                <a:cs typeface="Segoe UI" panose="020B0502040204020203" pitchFamily="34" charset="0"/>
+              </a:rPr>
+              <a:t>PowerShell Script</a:t>
+            </a:r>
+          </a:p>
+          <a:p>
+            <a:pPr marL="0" marR="0" lvl="0" indent="0" algn="ctr" defTabSz="914400" rtl="0" eaLnBrk="1" fontAlgn="auto" latinLnBrk="0" hangingPunct="1">
+              <a:lnSpc>
+                <a:spcPct val="100000"/>
+              </a:lnSpc>
+              <a:spcBef>
+                <a:spcPts val="0"/>
+              </a:spcBef>
+              <a:spcAft>
+                <a:spcPts val="0"/>
+              </a:spcAft>
+              <a:buClrTx/>
+              <a:buSzTx/>
+              <a:buFontTx/>
+              <a:buNone/>
+              <a:tabLst/>
+              <a:defRPr/>
+            </a:pPr>
+            <a:endParaRPr kumimoji="0" lang="en-US" sz="1400" b="0" i="0" u="none" strike="noStrike" kern="1200" cap="none" spc="0" normalizeH="0" baseline="0" noProof="0" dirty="0">
+              <a:ln>
+                <a:noFill/>
+              </a:ln>
+              <a:solidFill>
+                <a:prstClr val="black"/>
+              </a:solidFill>
+              <a:effectLst/>
+              <a:uLnTx/>
+              <a:uFillTx/>
+              <a:latin typeface="Segoe UI" panose="020B0502040204020203" pitchFamily="34" charset="0"/>
+              <a:ea typeface="+mn-ea"/>
+              <a:cs typeface="Segoe UI" panose="020B0502040204020203" pitchFamily="34" charset="0"/>
+            </a:endParaRPr>
+          </a:p>
+          <a:p>
+            <a:pPr marL="0" marR="0" lvl="0" indent="0" algn="ctr" defTabSz="914400" rtl="0" eaLnBrk="1" fontAlgn="auto" latinLnBrk="0" hangingPunct="1">
+              <a:lnSpc>
+                <a:spcPct val="100000"/>
+              </a:lnSpc>
+              <a:spcBef>
+                <a:spcPts val="0"/>
+              </a:spcBef>
+              <a:spcAft>
+                <a:spcPts val="0"/>
+              </a:spcAft>
+              <a:buClrTx/>
+              <a:buSzTx/>
+              <a:buFontTx/>
+              <a:buNone/>
+              <a:tabLst/>
+              <a:defRPr/>
+            </a:pPr>
+            <a:r>
+              <a:rPr kumimoji="0" lang="en-US" sz="1400" b="1" i="0" u="none" strike="noStrike" kern="1200" cap="none" spc="0" normalizeH="0" baseline="0" noProof="0" dirty="0">
+                <a:ln>
+                  <a:noFill/>
+                </a:ln>
+                <a:solidFill>
+                  <a:prstClr val="black"/>
+                </a:solidFill>
+                <a:effectLst/>
+                <a:uLnTx/>
+                <a:uFillTx/>
+                <a:latin typeface="Segoe UI" panose="020B0502040204020203" pitchFamily="34" charset="0"/>
+                <a:ea typeface="+mn-ea"/>
+                <a:cs typeface="Segoe UI" panose="020B0502040204020203" pitchFamily="34" charset="0"/>
+              </a:rPr>
+              <a:t>new-studydeployment.ps1</a:t>
+            </a:r>
+          </a:p>
+          <a:p>
+            <a:pPr marL="0" marR="0" lvl="0" indent="0" algn="ctr" defTabSz="914400" rtl="0" eaLnBrk="1" fontAlgn="auto" latinLnBrk="0" hangingPunct="1">
+              <a:lnSpc>
+                <a:spcPct val="100000"/>
+              </a:lnSpc>
+              <a:spcBef>
+                <a:spcPts val="0"/>
+              </a:spcBef>
+              <a:spcAft>
+                <a:spcPts val="0"/>
+              </a:spcAft>
+              <a:buClrTx/>
+              <a:buSzTx/>
+              <a:buFontTx/>
+              <a:buNone/>
+              <a:tabLst/>
+              <a:defRPr/>
+            </a:pPr>
+            <a:endParaRPr kumimoji="0" lang="en-US" sz="1400" b="0" i="0" u="none" strike="noStrike" kern="1200" cap="none" spc="0" normalizeH="0" baseline="0" noProof="0" dirty="0">
+              <a:ln>
+                <a:noFill/>
+              </a:ln>
+              <a:solidFill>
+                <a:prstClr val="black"/>
+              </a:solidFill>
+              <a:effectLst/>
+              <a:uLnTx/>
+              <a:uFillTx/>
+              <a:latin typeface="Segoe UI" panose="020B0502040204020203" pitchFamily="34" charset="0"/>
+              <a:ea typeface="+mn-ea"/>
+              <a:cs typeface="Segoe UI" panose="020B0502040204020203" pitchFamily="34" charset="0"/>
+            </a:endParaRPr>
+          </a:p>
+          <a:p>
+            <a:pPr marL="0" marR="0" lvl="0" indent="0" algn="ctr" defTabSz="914400" rtl="0" eaLnBrk="1" fontAlgn="auto" latinLnBrk="0" hangingPunct="1">
+              <a:lnSpc>
+                <a:spcPct val="100000"/>
+              </a:lnSpc>
+              <a:spcBef>
+                <a:spcPts val="0"/>
+              </a:spcBef>
+              <a:spcAft>
+                <a:spcPts val="0"/>
+              </a:spcAft>
+              <a:buClrTx/>
+              <a:buSzTx/>
+              <a:buFontTx/>
+              <a:buNone/>
+              <a:tabLst/>
+              <a:defRPr/>
+            </a:pPr>
+            <a:r>
+              <a:rPr kumimoji="0" lang="en-US" sz="1400" b="0" i="0" u="none" strike="noStrike" kern="1200" cap="none" spc="0" normalizeH="0" baseline="0" noProof="0" dirty="0">
+                <a:ln>
+                  <a:noFill/>
+                </a:ln>
+                <a:solidFill>
+                  <a:prstClr val="black"/>
+                </a:solidFill>
+                <a:effectLst/>
+                <a:uLnTx/>
+                <a:uFillTx/>
+                <a:latin typeface="Segoe UI" panose="020B0502040204020203" pitchFamily="34" charset="0"/>
+                <a:ea typeface="+mn-ea"/>
+                <a:cs typeface="Segoe UI" panose="020B0502040204020203" pitchFamily="34" charset="0"/>
+              </a:rPr>
+              <a:t>(Requires Az module)</a:t>
+            </a:r>
+          </a:p>
+        </p:txBody>
+      </p:sp>
+      <p:cxnSp>
+        <p:nvCxnSpPr>
+          <p:cNvPr id="8" name="Straight Arrow Connector 7">
+            <a:extLst>
+              <a:ext uri="{FF2B5EF4-FFF2-40B4-BE49-F238E27FC236}">
+                <a16:creationId xmlns:a16="http://schemas.microsoft.com/office/drawing/2014/main" id="{266AFA05-A3E0-4131-A6AE-880EC44B03AA}"/>
+              </a:ext>
+            </a:extLst>
+          </p:cNvPr>
+          <p:cNvCxnSpPr>
+            <a:cxnSpLocks/>
+            <a:stCxn id="6" idx="2"/>
+            <a:endCxn id="5" idx="0"/>
+          </p:cNvCxnSpPr>
+          <p:nvPr/>
+        </p:nvCxnSpPr>
+        <p:spPr>
+          <a:xfrm flipH="1">
+            <a:off x="4541061" y="3036738"/>
+            <a:ext cx="1" cy="457200"/>
+          </a:xfrm>
+          <a:prstGeom prst="straightConnector1">
+            <a:avLst/>
+          </a:prstGeom>
+          <a:ln>
+            <a:prstDash val="dash"/>
+            <a:tailEnd type="triangle"/>
+          </a:ln>
+        </p:spPr>
+        <p:style>
+          <a:lnRef idx="3">
+            <a:schemeClr val="accent6"/>
+          </a:lnRef>
+          <a:fillRef idx="0">
+            <a:schemeClr val="accent6"/>
+          </a:fillRef>
+          <a:effectRef idx="2">
+            <a:schemeClr val="accent6"/>
+          </a:effectRef>
+          <a:fontRef idx="minor">
+            <a:schemeClr val="tx1"/>
+          </a:fontRef>
+        </p:style>
+      </p:cxnSp>
+      <p:pic>
+        <p:nvPicPr>
+          <p:cNvPr id="10" name="Graphic 9" descr="User">
+            <a:extLst>
+              <a:ext uri="{FF2B5EF4-FFF2-40B4-BE49-F238E27FC236}">
+                <a16:creationId xmlns:a16="http://schemas.microsoft.com/office/drawing/2014/main" id="{95AC3ED5-8465-4DD6-9AD8-439C5AEB4B7C}"/>
+              </a:ext>
+            </a:extLst>
+          </p:cNvPr>
+          <p:cNvPicPr>
+            <a:picLocks noChangeAspect="1"/>
+          </p:cNvPicPr>
+          <p:nvPr/>
+        </p:nvPicPr>
+        <p:blipFill>
+          <a:blip r:embed="rId2">
+            <a:extLst>
+              <a:ext uri="{28A0092B-C50C-407E-A947-70E740481C1C}">
+                <a14:useLocalDpi xmlns:a14="http://schemas.microsoft.com/office/drawing/2010/main" val="0"/>
+              </a:ext>
+              <a:ext uri="{96DAC541-7B7A-43D3-8B79-37D633B846F1}">
+                <asvg:svgBlip xmlns:asvg="http://schemas.microsoft.com/office/drawing/2016/SVG/main" r:embed="rId3"/>
+              </a:ext>
+            </a:extLst>
+          </a:blip>
+          <a:stretch>
+            <a:fillRect/>
+          </a:stretch>
+        </p:blipFill>
+        <p:spPr>
+          <a:xfrm>
+            <a:off x="556891" y="1808831"/>
+            <a:ext cx="914400" cy="914400"/>
+          </a:xfrm>
+          <a:prstGeom prst="rect">
+            <a:avLst/>
+          </a:prstGeom>
+        </p:spPr>
+      </p:pic>
+      <p:cxnSp>
+        <p:nvCxnSpPr>
+          <p:cNvPr id="11" name="Straight Arrow Connector 10">
+            <a:extLst>
+              <a:ext uri="{FF2B5EF4-FFF2-40B4-BE49-F238E27FC236}">
+                <a16:creationId xmlns:a16="http://schemas.microsoft.com/office/drawing/2014/main" id="{C1AB1DB4-5847-4104-B121-3028D441F59C}"/>
+              </a:ext>
+            </a:extLst>
+          </p:cNvPr>
+          <p:cNvCxnSpPr>
+            <a:cxnSpLocks/>
+            <a:stCxn id="10" idx="3"/>
+            <a:endCxn id="6" idx="1"/>
+          </p:cNvCxnSpPr>
+          <p:nvPr/>
+        </p:nvCxnSpPr>
+        <p:spPr>
+          <a:xfrm>
+            <a:off x="1471291" y="2266031"/>
+            <a:ext cx="1780674" cy="0"/>
+          </a:xfrm>
+          <a:prstGeom prst="straightConnector1">
+            <a:avLst/>
+          </a:prstGeom>
+          <a:ln>
+            <a:tailEnd type="triangle"/>
+          </a:ln>
+        </p:spPr>
+        <p:style>
+          <a:lnRef idx="3">
+            <a:schemeClr val="accent6"/>
+          </a:lnRef>
+          <a:fillRef idx="0">
+            <a:schemeClr val="accent6"/>
+          </a:fillRef>
+          <a:effectRef idx="2">
+            <a:schemeClr val="accent6"/>
+          </a:effectRef>
+          <a:fontRef idx="minor">
+            <a:schemeClr val="tx1"/>
+          </a:fontRef>
+        </p:style>
+      </p:cxnSp>
+      <p:sp>
+        <p:nvSpPr>
+          <p:cNvPr id="14" name="TextBox 13">
+            <a:extLst>
+              <a:ext uri="{FF2B5EF4-FFF2-40B4-BE49-F238E27FC236}">
+                <a16:creationId xmlns:a16="http://schemas.microsoft.com/office/drawing/2014/main" id="{30BE9B3B-AB6D-402A-BF29-86495AD3A589}"/>
+              </a:ext>
+            </a:extLst>
+          </p:cNvPr>
+          <p:cNvSpPr txBox="1"/>
+          <p:nvPr/>
+        </p:nvSpPr>
+        <p:spPr>
+          <a:xfrm>
+            <a:off x="1576710" y="2356132"/>
+            <a:ext cx="1631729" cy="646331"/>
+          </a:xfrm>
+          <a:prstGeom prst="rect">
+            <a:avLst/>
+          </a:prstGeom>
+          <a:noFill/>
+        </p:spPr>
+        <p:txBody>
+          <a:bodyPr wrap="none" rtlCol="0">
+            <a:spAutoFit/>
+          </a:bodyPr>
+          <a:lstStyle/>
+          <a:p>
+            <a:pPr marL="0" marR="0" lvl="0" indent="0" algn="l" defTabSz="914400" rtl="0" eaLnBrk="1" fontAlgn="auto" latinLnBrk="0" hangingPunct="1">
+              <a:lnSpc>
+                <a:spcPct val="100000"/>
+              </a:lnSpc>
+              <a:spcBef>
+                <a:spcPts val="0"/>
+              </a:spcBef>
+              <a:spcAft>
+                <a:spcPts val="0"/>
+              </a:spcAft>
+              <a:buClrTx/>
+              <a:buSzTx/>
+              <a:buFontTx/>
+              <a:buNone/>
+              <a:tabLst/>
+              <a:defRPr/>
+            </a:pPr>
+            <a:r>
+              <a:rPr kumimoji="0" lang="en-US" sz="1200" b="0" i="0" u="none" strike="noStrike" kern="1200" cap="none" spc="0" normalizeH="0" baseline="0" noProof="0" dirty="0">
+                <a:ln>
+                  <a:noFill/>
+                </a:ln>
+                <a:solidFill>
+                  <a:prstClr val="black"/>
+                </a:solidFill>
+                <a:effectLst/>
+                <a:uLnTx/>
+                <a:uFillTx/>
+                <a:latin typeface="Segoe UI" panose="020B0502040204020203" pitchFamily="34" charset="0"/>
+                <a:ea typeface="+mn-ea"/>
+                <a:cs typeface="Segoe UI" panose="020B0502040204020203" pitchFamily="34" charset="0"/>
+              </a:rPr>
+              <a:t>Manually triggered</a:t>
+            </a:r>
+          </a:p>
+          <a:p>
+            <a:pPr marL="0" marR="0" lvl="0" indent="0" algn="l" defTabSz="914400" rtl="0" eaLnBrk="1" fontAlgn="auto" latinLnBrk="0" hangingPunct="1">
+              <a:lnSpc>
+                <a:spcPct val="100000"/>
+              </a:lnSpc>
+              <a:spcBef>
+                <a:spcPts val="0"/>
+              </a:spcBef>
+              <a:spcAft>
+                <a:spcPts val="0"/>
+              </a:spcAft>
+              <a:buClrTx/>
+              <a:buSzTx/>
+              <a:buFontTx/>
+              <a:buNone/>
+              <a:tabLst/>
+              <a:defRPr/>
+            </a:pPr>
+            <a:r>
+              <a:rPr kumimoji="0" lang="en-US" sz="1200" b="0" i="0" u="none" strike="noStrike" kern="1200" cap="none" spc="0" normalizeH="0" baseline="0" noProof="0" dirty="0">
+                <a:ln>
+                  <a:noFill/>
+                </a:ln>
+                <a:solidFill>
+                  <a:prstClr val="black"/>
+                </a:solidFill>
+                <a:effectLst/>
+                <a:uLnTx/>
+                <a:uFillTx/>
+                <a:latin typeface="Segoe UI" panose="020B0502040204020203" pitchFamily="34" charset="0"/>
+                <a:ea typeface="+mn-ea"/>
+                <a:cs typeface="Segoe UI" panose="020B0502040204020203" pitchFamily="34" charset="0"/>
+              </a:rPr>
+              <a:t>(from e.g. admin PC </a:t>
+            </a:r>
+          </a:p>
+          <a:p>
+            <a:pPr marL="0" marR="0" lvl="0" indent="0" algn="l" defTabSz="914400" rtl="0" eaLnBrk="1" fontAlgn="auto" latinLnBrk="0" hangingPunct="1">
+              <a:lnSpc>
+                <a:spcPct val="100000"/>
+              </a:lnSpc>
+              <a:spcBef>
+                <a:spcPts val="0"/>
+              </a:spcBef>
+              <a:spcAft>
+                <a:spcPts val="0"/>
+              </a:spcAft>
+              <a:buClrTx/>
+              <a:buSzTx/>
+              <a:buFontTx/>
+              <a:buNone/>
+              <a:tabLst/>
+              <a:defRPr/>
+            </a:pPr>
+            <a:r>
+              <a:rPr kumimoji="0" lang="en-US" sz="1200" b="0" i="0" u="none" strike="noStrike" kern="1200" cap="none" spc="0" normalizeH="0" baseline="0" noProof="0" dirty="0">
+                <a:ln>
+                  <a:noFill/>
+                </a:ln>
+                <a:solidFill>
+                  <a:prstClr val="black"/>
+                </a:solidFill>
+                <a:effectLst/>
+                <a:uLnTx/>
+                <a:uFillTx/>
+                <a:latin typeface="Segoe UI" panose="020B0502040204020203" pitchFamily="34" charset="0"/>
+                <a:ea typeface="+mn-ea"/>
+                <a:cs typeface="Segoe UI" panose="020B0502040204020203" pitchFamily="34" charset="0"/>
+              </a:rPr>
+              <a:t>Or Azure Cloud Shell)</a:t>
+            </a:r>
+          </a:p>
+        </p:txBody>
+      </p:sp>
+      <p:sp>
+        <p:nvSpPr>
+          <p:cNvPr id="16" name="Rectangle: Rounded Corners 15">
+            <a:extLst>
+              <a:ext uri="{FF2B5EF4-FFF2-40B4-BE49-F238E27FC236}">
+                <a16:creationId xmlns:a16="http://schemas.microsoft.com/office/drawing/2014/main" id="{C9B494A9-8AD0-4F27-BBFC-983C13FEFF19}"/>
+              </a:ext>
+            </a:extLst>
+          </p:cNvPr>
+          <p:cNvSpPr/>
+          <p:nvPr/>
+        </p:nvSpPr>
+        <p:spPr>
+          <a:xfrm>
+            <a:off x="8456483" y="1489818"/>
+            <a:ext cx="673767" cy="1546920"/>
+          </a:xfrm>
+          <a:prstGeom prst="roundRect">
+            <a:avLst>
+              <a:gd name="adj" fmla="val 3864"/>
+            </a:avLst>
+          </a:prstGeom>
+        </p:spPr>
+        <p:style>
+          <a:lnRef idx="2">
+            <a:schemeClr val="accent5"/>
+          </a:lnRef>
+          <a:fillRef idx="1">
+            <a:schemeClr val="lt1"/>
+          </a:fillRef>
+          <a:effectRef idx="0">
+            <a:schemeClr val="accent5"/>
+          </a:effectRef>
+          <a:fontRef idx="minor">
+            <a:schemeClr val="dk1"/>
+          </a:fontRef>
+        </p:style>
+        <p:txBody>
+          <a:bodyPr vert="vert" rtlCol="0" anchor="ctr"/>
+          <a:lstStyle/>
+          <a:p>
+            <a:pPr marL="0" marR="0" lvl="0" indent="0" algn="ctr" defTabSz="914400" rtl="0" eaLnBrk="1" fontAlgn="auto" latinLnBrk="0" hangingPunct="1">
+              <a:lnSpc>
+                <a:spcPct val="100000"/>
+              </a:lnSpc>
+              <a:spcBef>
+                <a:spcPts val="0"/>
+              </a:spcBef>
+              <a:spcAft>
+                <a:spcPts val="0"/>
+              </a:spcAft>
+              <a:buClrTx/>
+              <a:buSzTx/>
+              <a:buFontTx/>
+              <a:buNone/>
+              <a:tabLst/>
+              <a:defRPr/>
+            </a:pPr>
+            <a:r>
+              <a:rPr kumimoji="0" lang="en-US" sz="1200" b="1" i="0" u="none" strike="noStrike" kern="1200" cap="none" spc="0" normalizeH="0" baseline="0" noProof="0" dirty="0">
+                <a:ln>
+                  <a:noFill/>
+                </a:ln>
+                <a:solidFill>
+                  <a:srgbClr val="0070C0"/>
+                </a:solidFill>
+                <a:effectLst/>
+                <a:uLnTx/>
+                <a:uFillTx/>
+                <a:latin typeface="Segoe UI" panose="020B0502040204020203" pitchFamily="34" charset="0"/>
+                <a:ea typeface="+mn-ea"/>
+                <a:cs typeface="Segoe UI" panose="020B0502040204020203" pitchFamily="34" charset="0"/>
+              </a:rPr>
+              <a:t>Azure Resource Manager API</a:t>
+            </a:r>
+            <a:endParaRPr kumimoji="0" lang="en-US" sz="1050" b="0" i="0" u="none" strike="noStrike" kern="1200" cap="none" spc="0" normalizeH="0" baseline="0" noProof="0" dirty="0">
+              <a:ln>
+                <a:noFill/>
+              </a:ln>
+              <a:solidFill>
+                <a:prstClr val="black"/>
+              </a:solidFill>
+              <a:effectLst/>
+              <a:uLnTx/>
+              <a:uFillTx/>
+              <a:latin typeface="Segoe UI" panose="020B0502040204020203" pitchFamily="34" charset="0"/>
+              <a:ea typeface="+mn-ea"/>
+              <a:cs typeface="Segoe UI" panose="020B0502040204020203" pitchFamily="34" charset="0"/>
+            </a:endParaRPr>
+          </a:p>
+        </p:txBody>
+      </p:sp>
+      <p:sp>
+        <p:nvSpPr>
+          <p:cNvPr id="18" name="Rectangle: Rounded Corners 17">
+            <a:extLst>
+              <a:ext uri="{FF2B5EF4-FFF2-40B4-BE49-F238E27FC236}">
+                <a16:creationId xmlns:a16="http://schemas.microsoft.com/office/drawing/2014/main" id="{0B1DC18D-8C27-4205-B168-544DAC450AFA}"/>
+              </a:ext>
+            </a:extLst>
+          </p:cNvPr>
+          <p:cNvSpPr/>
+          <p:nvPr/>
+        </p:nvSpPr>
+        <p:spPr>
+          <a:xfrm>
+            <a:off x="9212755" y="1489818"/>
+            <a:ext cx="1780674" cy="1546920"/>
+          </a:xfrm>
+          <a:prstGeom prst="roundRect">
+            <a:avLst>
+              <a:gd name="adj" fmla="val 3864"/>
+            </a:avLst>
+          </a:prstGeom>
+        </p:spPr>
+        <p:style>
+          <a:lnRef idx="2">
+            <a:schemeClr val="accent5"/>
+          </a:lnRef>
+          <a:fillRef idx="1">
+            <a:schemeClr val="lt1"/>
+          </a:fillRef>
+          <a:effectRef idx="0">
+            <a:schemeClr val="accent5"/>
+          </a:effectRef>
+          <a:fontRef idx="minor">
+            <a:schemeClr val="dk1"/>
+          </a:fontRef>
+        </p:style>
+        <p:txBody>
+          <a:bodyPr rtlCol="0" anchor="t"/>
+          <a:lstStyle/>
+          <a:p>
+            <a:pPr marL="0" marR="0" lvl="0" indent="0" algn="ctr" defTabSz="914400" rtl="0" eaLnBrk="1" fontAlgn="auto" latinLnBrk="0" hangingPunct="1">
+              <a:lnSpc>
+                <a:spcPct val="100000"/>
+              </a:lnSpc>
+              <a:spcBef>
+                <a:spcPts val="0"/>
+              </a:spcBef>
+              <a:spcAft>
+                <a:spcPts val="0"/>
+              </a:spcAft>
+              <a:buClrTx/>
+              <a:buSzTx/>
+              <a:buFontTx/>
+              <a:buNone/>
+              <a:tabLst/>
+              <a:defRPr/>
+            </a:pPr>
+            <a:r>
+              <a:rPr kumimoji="0" lang="en-US" sz="1400" b="0" i="0" u="none" strike="noStrike" kern="1200" cap="none" spc="0" normalizeH="0" baseline="0" noProof="0" dirty="0">
+                <a:ln>
+                  <a:noFill/>
+                </a:ln>
+                <a:solidFill>
+                  <a:srgbClr val="0070C0"/>
+                </a:solidFill>
+                <a:effectLst/>
+                <a:uLnTx/>
+                <a:uFillTx/>
+                <a:latin typeface="Segoe UI" panose="020B0502040204020203" pitchFamily="34" charset="0"/>
+                <a:ea typeface="+mn-ea"/>
+                <a:cs typeface="Segoe UI" panose="020B0502040204020203" pitchFamily="34" charset="0"/>
+              </a:rPr>
+              <a:t>Azure subscription</a:t>
+            </a:r>
+          </a:p>
+          <a:p>
+            <a:pPr marL="0" marR="0" lvl="0" indent="0" algn="ctr" defTabSz="914400" rtl="0" eaLnBrk="1" fontAlgn="auto" latinLnBrk="0" hangingPunct="1">
+              <a:lnSpc>
+                <a:spcPct val="100000"/>
+              </a:lnSpc>
+              <a:spcBef>
+                <a:spcPts val="0"/>
+              </a:spcBef>
+              <a:spcAft>
+                <a:spcPts val="0"/>
+              </a:spcAft>
+              <a:buClrTx/>
+              <a:buSzTx/>
+              <a:buFontTx/>
+              <a:buNone/>
+              <a:tabLst/>
+              <a:defRPr/>
+            </a:pPr>
+            <a:endParaRPr kumimoji="0" lang="en-US" sz="1800" b="0" i="0" u="none" strike="noStrike" kern="1200" cap="none" spc="0" normalizeH="0" baseline="0" noProof="0" dirty="0">
+              <a:ln>
+                <a:noFill/>
+              </a:ln>
+              <a:solidFill>
+                <a:prstClr val="black"/>
+              </a:solidFill>
+              <a:effectLst/>
+              <a:uLnTx/>
+              <a:uFillTx/>
+              <a:latin typeface="Segoe UI" panose="020B0502040204020203" pitchFamily="34" charset="0"/>
+              <a:ea typeface="+mn-ea"/>
+              <a:cs typeface="Segoe UI" panose="020B0502040204020203" pitchFamily="34" charset="0"/>
+            </a:endParaRPr>
+          </a:p>
+          <a:p>
+            <a:pPr marL="0" marR="0" lvl="0" indent="0" algn="ctr" defTabSz="914400" rtl="0" eaLnBrk="1" fontAlgn="auto" latinLnBrk="0" hangingPunct="1">
+              <a:lnSpc>
+                <a:spcPct val="100000"/>
+              </a:lnSpc>
+              <a:spcBef>
+                <a:spcPts val="0"/>
+              </a:spcBef>
+              <a:spcAft>
+                <a:spcPts val="0"/>
+              </a:spcAft>
+              <a:buClrTx/>
+              <a:buSzTx/>
+              <a:buFontTx/>
+              <a:buNone/>
+              <a:tabLst/>
+              <a:defRPr/>
+            </a:pPr>
+            <a:endParaRPr kumimoji="0" lang="en-US" sz="1400" b="0" i="0" u="none" strike="noStrike" kern="1200" cap="none" spc="0" normalizeH="0" baseline="0" noProof="0" dirty="0">
+              <a:ln>
+                <a:noFill/>
+              </a:ln>
+              <a:solidFill>
+                <a:prstClr val="black"/>
+              </a:solidFill>
+              <a:effectLst/>
+              <a:uLnTx/>
+              <a:uFillTx/>
+              <a:latin typeface="Segoe UI" panose="020B0502040204020203" pitchFamily="34" charset="0"/>
+              <a:ea typeface="+mn-ea"/>
+              <a:cs typeface="Segoe UI" panose="020B0502040204020203" pitchFamily="34" charset="0"/>
+            </a:endParaRPr>
+          </a:p>
+        </p:txBody>
+      </p:sp>
+      <p:pic>
+        <p:nvPicPr>
+          <p:cNvPr id="20" name="Picture 19" descr="A picture containing furniture, table&#10;&#10;Description automatically generated">
+            <a:extLst>
+              <a:ext uri="{FF2B5EF4-FFF2-40B4-BE49-F238E27FC236}">
+                <a16:creationId xmlns:a16="http://schemas.microsoft.com/office/drawing/2014/main" id="{9BAF7A04-0F57-44AE-B98F-908E283AC67F}"/>
+              </a:ext>
+            </a:extLst>
+          </p:cNvPr>
+          <p:cNvPicPr>
+            <a:picLocks noChangeAspect="1"/>
+          </p:cNvPicPr>
+          <p:nvPr/>
+        </p:nvPicPr>
+        <p:blipFill>
+          <a:blip r:embed="rId4">
+            <a:extLst>
+              <a:ext uri="{28A0092B-C50C-407E-A947-70E740481C1C}">
+                <a14:useLocalDpi xmlns:a14="http://schemas.microsoft.com/office/drawing/2010/main" val="0"/>
+              </a:ext>
+            </a:extLst>
+          </a:blip>
+          <a:stretch>
+            <a:fillRect/>
+          </a:stretch>
+        </p:blipFill>
+        <p:spPr>
+          <a:xfrm>
+            <a:off x="3955504" y="5126131"/>
+            <a:ext cx="457178" cy="457178"/>
+          </a:xfrm>
+          <a:prstGeom prst="rect">
+            <a:avLst/>
+          </a:prstGeom>
+        </p:spPr>
+      </p:pic>
+      <p:pic>
+        <p:nvPicPr>
+          <p:cNvPr id="22" name="Picture 21">
+            <a:extLst>
+              <a:ext uri="{FF2B5EF4-FFF2-40B4-BE49-F238E27FC236}">
+                <a16:creationId xmlns:a16="http://schemas.microsoft.com/office/drawing/2014/main" id="{D6E0E84C-EC2B-461C-8BF0-B18119D2F7E4}"/>
+              </a:ext>
+            </a:extLst>
+          </p:cNvPr>
+          <p:cNvPicPr>
+            <a:picLocks noChangeAspect="1"/>
+          </p:cNvPicPr>
+          <p:nvPr/>
+        </p:nvPicPr>
+        <p:blipFill>
+          <a:blip r:embed="rId5">
+            <a:extLst>
+              <a:ext uri="{28A0092B-C50C-407E-A947-70E740481C1C}">
+                <a14:useLocalDpi xmlns:a14="http://schemas.microsoft.com/office/drawing/2010/main" val="0"/>
+              </a:ext>
+            </a:extLst>
+          </a:blip>
+          <a:stretch>
+            <a:fillRect/>
+          </a:stretch>
+        </p:blipFill>
+        <p:spPr>
+          <a:xfrm>
+            <a:off x="9712947" y="2049486"/>
+            <a:ext cx="780290" cy="780290"/>
+          </a:xfrm>
+          <a:prstGeom prst="rect">
+            <a:avLst/>
+          </a:prstGeom>
+        </p:spPr>
+      </p:pic>
+      <p:pic>
+        <p:nvPicPr>
+          <p:cNvPr id="24" name="Picture 23" descr="A close up of a logo&#10;&#10;Description automatically generated">
+            <a:extLst>
+              <a:ext uri="{FF2B5EF4-FFF2-40B4-BE49-F238E27FC236}">
+                <a16:creationId xmlns:a16="http://schemas.microsoft.com/office/drawing/2014/main" id="{83C85BA9-5C01-4228-AD32-FD5400B94576}"/>
+              </a:ext>
+            </a:extLst>
+          </p:cNvPr>
+          <p:cNvPicPr>
+            <a:picLocks noChangeAspect="1"/>
+          </p:cNvPicPr>
+          <p:nvPr/>
+        </p:nvPicPr>
+        <p:blipFill>
+          <a:blip r:embed="rId6">
+            <a:extLst>
+              <a:ext uri="{28A0092B-C50C-407E-A947-70E740481C1C}">
+                <a14:useLocalDpi xmlns:a14="http://schemas.microsoft.com/office/drawing/2010/main" val="0"/>
+              </a:ext>
+            </a:extLst>
+          </a:blip>
+          <a:stretch>
+            <a:fillRect/>
+          </a:stretch>
+        </p:blipFill>
+        <p:spPr>
+          <a:xfrm>
+            <a:off x="8506351" y="3877253"/>
+            <a:ext cx="780290" cy="780290"/>
+          </a:xfrm>
+          <a:prstGeom prst="rect">
+            <a:avLst/>
+          </a:prstGeom>
+        </p:spPr>
+      </p:pic>
+      <p:pic>
+        <p:nvPicPr>
+          <p:cNvPr id="28" name="Picture 27">
+            <a:extLst>
+              <a:ext uri="{FF2B5EF4-FFF2-40B4-BE49-F238E27FC236}">
+                <a16:creationId xmlns:a16="http://schemas.microsoft.com/office/drawing/2014/main" id="{CFA88932-C05A-47E0-B632-67D16B4E26AF}"/>
+              </a:ext>
+            </a:extLst>
+          </p:cNvPr>
+          <p:cNvPicPr>
+            <a:picLocks noChangeAspect="1"/>
+          </p:cNvPicPr>
+          <p:nvPr/>
+        </p:nvPicPr>
+        <p:blipFill>
+          <a:blip r:embed="rId7">
+            <a:extLst>
+              <a:ext uri="{28A0092B-C50C-407E-A947-70E740481C1C}">
+                <a14:useLocalDpi xmlns:a14="http://schemas.microsoft.com/office/drawing/2010/main" val="0"/>
+              </a:ext>
+            </a:extLst>
+          </a:blip>
+          <a:stretch>
+            <a:fillRect/>
+          </a:stretch>
+        </p:blipFill>
+        <p:spPr>
+          <a:xfrm>
+            <a:off x="4571407" y="5126131"/>
+            <a:ext cx="457179" cy="457179"/>
+          </a:xfrm>
+          <a:prstGeom prst="rect">
+            <a:avLst/>
+          </a:prstGeom>
+        </p:spPr>
+      </p:pic>
+      <p:cxnSp>
+        <p:nvCxnSpPr>
+          <p:cNvPr id="29" name="Straight Arrow Connector 28">
+            <a:extLst>
+              <a:ext uri="{FF2B5EF4-FFF2-40B4-BE49-F238E27FC236}">
+                <a16:creationId xmlns:a16="http://schemas.microsoft.com/office/drawing/2014/main" id="{17CCB720-E1DD-4C19-B8B2-4C7EDE30EA1B}"/>
+              </a:ext>
+            </a:extLst>
+          </p:cNvPr>
+          <p:cNvCxnSpPr>
+            <a:cxnSpLocks/>
+            <a:stCxn id="6" idx="3"/>
+          </p:cNvCxnSpPr>
+          <p:nvPr/>
+        </p:nvCxnSpPr>
+        <p:spPr>
+          <a:xfrm>
+            <a:off x="5830159" y="2266031"/>
+            <a:ext cx="2676192" cy="0"/>
+          </a:xfrm>
+          <a:prstGeom prst="straightConnector1">
+            <a:avLst/>
+          </a:prstGeom>
+          <a:ln>
+            <a:tailEnd type="triangle"/>
+          </a:ln>
+        </p:spPr>
+        <p:style>
+          <a:lnRef idx="3">
+            <a:schemeClr val="accent6"/>
+          </a:lnRef>
+          <a:fillRef idx="0">
+            <a:schemeClr val="accent6"/>
+          </a:fillRef>
+          <a:effectRef idx="2">
+            <a:schemeClr val="accent6"/>
+          </a:effectRef>
+          <a:fontRef idx="minor">
+            <a:schemeClr val="tx1"/>
+          </a:fontRef>
+        </p:style>
+      </p:cxnSp>
+      <p:sp>
+        <p:nvSpPr>
+          <p:cNvPr id="34" name="TextBox 33">
+            <a:extLst>
+              <a:ext uri="{FF2B5EF4-FFF2-40B4-BE49-F238E27FC236}">
+                <a16:creationId xmlns:a16="http://schemas.microsoft.com/office/drawing/2014/main" id="{F1377B49-31C0-477B-8378-1E2322DD58F4}"/>
+              </a:ext>
+            </a:extLst>
+          </p:cNvPr>
+          <p:cNvSpPr txBox="1"/>
+          <p:nvPr/>
+        </p:nvSpPr>
+        <p:spPr>
+          <a:xfrm>
+            <a:off x="8384048" y="4736357"/>
+            <a:ext cx="1024896" cy="461665"/>
+          </a:xfrm>
+          <a:prstGeom prst="rect">
+            <a:avLst/>
+          </a:prstGeom>
+          <a:noFill/>
+        </p:spPr>
+        <p:txBody>
+          <a:bodyPr wrap="none" rtlCol="0">
+            <a:spAutoFit/>
+          </a:bodyPr>
+          <a:lstStyle/>
+          <a:p>
+            <a:pPr marL="0" marR="0" lvl="0" indent="0" algn="ctr" defTabSz="914400" rtl="0" eaLnBrk="1" fontAlgn="auto" latinLnBrk="0" hangingPunct="1">
+              <a:lnSpc>
+                <a:spcPct val="100000"/>
+              </a:lnSpc>
+              <a:spcBef>
+                <a:spcPts val="0"/>
+              </a:spcBef>
+              <a:spcAft>
+                <a:spcPts val="0"/>
+              </a:spcAft>
+              <a:buClrTx/>
+              <a:buSzTx/>
+              <a:buFontTx/>
+              <a:buNone/>
+              <a:tabLst/>
+              <a:defRPr/>
+            </a:pPr>
+            <a:r>
+              <a:rPr kumimoji="0" lang="en-US" sz="1200" b="0" i="0" u="none" strike="noStrike" kern="1200" cap="none" spc="0" normalizeH="0" baseline="0" noProof="0" dirty="0">
+                <a:ln>
+                  <a:noFill/>
+                </a:ln>
+                <a:solidFill>
+                  <a:prstClr val="black"/>
+                </a:solidFill>
+                <a:effectLst/>
+                <a:uLnTx/>
+                <a:uFillTx/>
+                <a:latin typeface="Segoe UI" panose="020B0502040204020203" pitchFamily="34" charset="0"/>
+                <a:ea typeface="+mn-ea"/>
+                <a:cs typeface="Segoe UI" panose="020B0502040204020203" pitchFamily="34" charset="0"/>
+              </a:rPr>
+              <a:t>Azure Active</a:t>
+            </a:r>
+          </a:p>
+          <a:p>
+            <a:pPr marL="0" marR="0" lvl="0" indent="0" algn="ctr" defTabSz="914400" rtl="0" eaLnBrk="1" fontAlgn="auto" latinLnBrk="0" hangingPunct="1">
+              <a:lnSpc>
+                <a:spcPct val="100000"/>
+              </a:lnSpc>
+              <a:spcBef>
+                <a:spcPts val="0"/>
+              </a:spcBef>
+              <a:spcAft>
+                <a:spcPts val="0"/>
+              </a:spcAft>
+              <a:buClrTx/>
+              <a:buSzTx/>
+              <a:buFontTx/>
+              <a:buNone/>
+              <a:tabLst/>
+              <a:defRPr/>
+            </a:pPr>
+            <a:r>
+              <a:rPr kumimoji="0" lang="en-US" sz="1200" b="0" i="0" u="none" strike="noStrike" kern="1200" cap="none" spc="0" normalizeH="0" baseline="0" noProof="0" dirty="0">
+                <a:ln>
+                  <a:noFill/>
+                </a:ln>
+                <a:solidFill>
+                  <a:prstClr val="black"/>
+                </a:solidFill>
+                <a:effectLst/>
+                <a:uLnTx/>
+                <a:uFillTx/>
+                <a:latin typeface="Segoe UI" panose="020B0502040204020203" pitchFamily="34" charset="0"/>
+                <a:ea typeface="+mn-ea"/>
+                <a:cs typeface="Segoe UI" panose="020B0502040204020203" pitchFamily="34" charset="0"/>
+              </a:rPr>
+              <a:t>Directory</a:t>
+            </a:r>
+          </a:p>
+        </p:txBody>
+      </p:sp>
+      <p:cxnSp>
+        <p:nvCxnSpPr>
+          <p:cNvPr id="35" name="Straight Arrow Connector 34">
+            <a:extLst>
+              <a:ext uri="{FF2B5EF4-FFF2-40B4-BE49-F238E27FC236}">
+                <a16:creationId xmlns:a16="http://schemas.microsoft.com/office/drawing/2014/main" id="{64816336-9D40-408A-95C5-91BBBA25673A}"/>
+              </a:ext>
+            </a:extLst>
+          </p:cNvPr>
+          <p:cNvCxnSpPr>
+            <a:cxnSpLocks/>
+            <a:stCxn id="6" idx="3"/>
+            <a:endCxn id="24" idx="1"/>
+          </p:cNvCxnSpPr>
+          <p:nvPr/>
+        </p:nvCxnSpPr>
+        <p:spPr>
+          <a:xfrm>
+            <a:off x="5830159" y="2266031"/>
+            <a:ext cx="2676192" cy="2001367"/>
+          </a:xfrm>
+          <a:prstGeom prst="straightConnector1">
+            <a:avLst/>
+          </a:prstGeom>
+          <a:ln>
+            <a:prstDash val="dash"/>
+            <a:tailEnd type="triangle"/>
+          </a:ln>
+        </p:spPr>
+        <p:style>
+          <a:lnRef idx="3">
+            <a:schemeClr val="accent6"/>
+          </a:lnRef>
+          <a:fillRef idx="0">
+            <a:schemeClr val="accent6"/>
+          </a:fillRef>
+          <a:effectRef idx="2">
+            <a:schemeClr val="accent6"/>
+          </a:effectRef>
+          <a:fontRef idx="minor">
+            <a:schemeClr val="tx1"/>
+          </a:fontRef>
+        </p:style>
+      </p:cxnSp>
+      <p:sp>
+        <p:nvSpPr>
+          <p:cNvPr id="38" name="TextBox 37">
+            <a:extLst>
+              <a:ext uri="{FF2B5EF4-FFF2-40B4-BE49-F238E27FC236}">
+                <a16:creationId xmlns:a16="http://schemas.microsoft.com/office/drawing/2014/main" id="{55CF002F-4C2A-448E-A86E-D287874A843E}"/>
+              </a:ext>
+            </a:extLst>
+          </p:cNvPr>
+          <p:cNvSpPr txBox="1"/>
+          <p:nvPr/>
+        </p:nvSpPr>
+        <p:spPr>
+          <a:xfrm rot="1773900">
+            <a:off x="6368756" y="3376265"/>
+            <a:ext cx="1026628" cy="276999"/>
+          </a:xfrm>
+          <a:prstGeom prst="rect">
+            <a:avLst/>
+          </a:prstGeom>
+          <a:noFill/>
+        </p:spPr>
+        <p:txBody>
+          <a:bodyPr wrap="none" rtlCol="0">
+            <a:spAutoFit/>
+          </a:bodyPr>
+          <a:lstStyle/>
+          <a:p>
+            <a:pPr marL="0" marR="0" lvl="0" indent="0" algn="ctr" defTabSz="914400" rtl="0" eaLnBrk="1" fontAlgn="auto" latinLnBrk="0" hangingPunct="1">
+              <a:lnSpc>
+                <a:spcPct val="100000"/>
+              </a:lnSpc>
+              <a:spcBef>
+                <a:spcPts val="0"/>
+              </a:spcBef>
+              <a:spcAft>
+                <a:spcPts val="0"/>
+              </a:spcAft>
+              <a:buClrTx/>
+              <a:buSzTx/>
+              <a:buFontTx/>
+              <a:buNone/>
+              <a:tabLst/>
+              <a:defRPr/>
+            </a:pPr>
+            <a:r>
+              <a:rPr kumimoji="0" lang="en-US" sz="1200" b="0" i="0" u="none" strike="noStrike" kern="1200" cap="none" spc="0" normalizeH="0" baseline="0" noProof="0" dirty="0">
+                <a:ln>
+                  <a:noFill/>
+                </a:ln>
+                <a:solidFill>
+                  <a:srgbClr val="70AD47"/>
+                </a:solidFill>
+                <a:effectLst/>
+                <a:uLnTx/>
+                <a:uFillTx/>
+                <a:latin typeface="Segoe UI" panose="020B0502040204020203" pitchFamily="34" charset="0"/>
+                <a:ea typeface="+mn-ea"/>
+                <a:cs typeface="Segoe UI" panose="020B0502040204020203" pitchFamily="34" charset="0"/>
+              </a:rPr>
+              <a:t>authenticate</a:t>
+            </a:r>
+          </a:p>
+        </p:txBody>
+      </p:sp>
+      <p:sp>
+        <p:nvSpPr>
+          <p:cNvPr id="39" name="TextBox 38">
+            <a:extLst>
+              <a:ext uri="{FF2B5EF4-FFF2-40B4-BE49-F238E27FC236}">
+                <a16:creationId xmlns:a16="http://schemas.microsoft.com/office/drawing/2014/main" id="{347BD6DF-7F8E-4EB5-8DD2-01D88C5601D0}"/>
+              </a:ext>
+            </a:extLst>
+          </p:cNvPr>
+          <p:cNvSpPr txBox="1"/>
+          <p:nvPr/>
+        </p:nvSpPr>
+        <p:spPr>
+          <a:xfrm>
+            <a:off x="6558904" y="2258949"/>
+            <a:ext cx="646331" cy="276999"/>
+          </a:xfrm>
+          <a:prstGeom prst="rect">
+            <a:avLst/>
+          </a:prstGeom>
+          <a:noFill/>
+        </p:spPr>
+        <p:txBody>
+          <a:bodyPr wrap="none" rtlCol="0">
+            <a:spAutoFit/>
+          </a:bodyPr>
+          <a:lstStyle/>
+          <a:p>
+            <a:pPr marL="0" marR="0" lvl="0" indent="0" algn="ctr" defTabSz="914400" rtl="0" eaLnBrk="1" fontAlgn="auto" latinLnBrk="0" hangingPunct="1">
+              <a:lnSpc>
+                <a:spcPct val="100000"/>
+              </a:lnSpc>
+              <a:spcBef>
+                <a:spcPts val="0"/>
+              </a:spcBef>
+              <a:spcAft>
+                <a:spcPts val="0"/>
+              </a:spcAft>
+              <a:buClrTx/>
+              <a:buSzTx/>
+              <a:buFontTx/>
+              <a:buNone/>
+              <a:tabLst/>
+              <a:defRPr/>
+            </a:pPr>
+            <a:r>
+              <a:rPr kumimoji="0" lang="en-US" sz="1200" b="0" i="0" u="none" strike="noStrike" kern="1200" cap="none" spc="0" normalizeH="0" baseline="0" noProof="0" dirty="0">
+                <a:ln>
+                  <a:noFill/>
+                </a:ln>
+                <a:solidFill>
+                  <a:srgbClr val="70AD47"/>
+                </a:solidFill>
+                <a:effectLst/>
+                <a:uLnTx/>
+                <a:uFillTx/>
+                <a:latin typeface="Segoe UI" panose="020B0502040204020203" pitchFamily="34" charset="0"/>
+                <a:ea typeface="+mn-ea"/>
+                <a:cs typeface="Segoe UI" panose="020B0502040204020203" pitchFamily="34" charset="0"/>
+              </a:rPr>
+              <a:t>deploy</a:t>
+            </a:r>
+          </a:p>
+        </p:txBody>
+      </p:sp>
+      <p:sp>
+        <p:nvSpPr>
+          <p:cNvPr id="41" name="TextBox 40">
+            <a:extLst>
+              <a:ext uri="{FF2B5EF4-FFF2-40B4-BE49-F238E27FC236}">
+                <a16:creationId xmlns:a16="http://schemas.microsoft.com/office/drawing/2014/main" id="{A4E56B21-EE2D-4F80-B89D-B0DB18BCA64E}"/>
+              </a:ext>
+            </a:extLst>
+          </p:cNvPr>
+          <p:cNvSpPr txBox="1"/>
+          <p:nvPr/>
+        </p:nvSpPr>
+        <p:spPr>
+          <a:xfrm>
+            <a:off x="653144" y="6125764"/>
+            <a:ext cx="4689297" cy="307777"/>
+          </a:xfrm>
+          <a:prstGeom prst="rect">
+            <a:avLst/>
+          </a:prstGeom>
+          <a:noFill/>
+        </p:spPr>
+        <p:txBody>
+          <a:bodyPr wrap="none" rtlCol="0">
+            <a:spAutoFit/>
+          </a:bodyPr>
+          <a:lstStyle/>
+          <a:p>
+            <a:pPr marL="0" marR="0" lvl="0" indent="0" algn="l" defTabSz="914400" rtl="0" eaLnBrk="1" fontAlgn="auto" latinLnBrk="0" hangingPunct="1">
+              <a:lnSpc>
+                <a:spcPct val="100000"/>
+              </a:lnSpc>
+              <a:spcBef>
+                <a:spcPts val="0"/>
+              </a:spcBef>
+              <a:spcAft>
+                <a:spcPts val="0"/>
+              </a:spcAft>
+              <a:buClrTx/>
+              <a:buSzTx/>
+              <a:buFontTx/>
+              <a:buNone/>
+              <a:tabLst/>
+              <a:defRPr/>
+            </a:pPr>
+            <a:r>
+              <a:rPr kumimoji="0" lang="en-US" sz="1400" b="1" i="0" u="none" strike="noStrike" kern="1200" cap="none" spc="0" normalizeH="0" baseline="0" noProof="0" dirty="0">
+                <a:ln>
+                  <a:noFill/>
+                </a:ln>
+                <a:solidFill>
+                  <a:prstClr val="black"/>
+                </a:solidFill>
+                <a:effectLst/>
+                <a:uLnTx/>
+                <a:uFillTx/>
+                <a:latin typeface="Segoe UI" panose="020B0502040204020203" pitchFamily="34" charset="0"/>
+                <a:ea typeface="+mn-ea"/>
+                <a:cs typeface="Segoe UI" panose="020B0502040204020203" pitchFamily="34" charset="0"/>
+              </a:rPr>
+              <a:t>Input parameters: </a:t>
+            </a:r>
+            <a:r>
+              <a:rPr kumimoji="0" lang="en-US" sz="1400" b="0" i="0" u="none" strike="noStrike" kern="1200" cap="none" spc="0" normalizeH="0" baseline="0" noProof="0" dirty="0" err="1">
+                <a:ln>
+                  <a:noFill/>
+                </a:ln>
+                <a:solidFill>
+                  <a:prstClr val="black"/>
+                </a:solidFill>
+                <a:effectLst/>
+                <a:uLnTx/>
+                <a:uFillTx/>
+                <a:latin typeface="Segoe UI" panose="020B0502040204020203" pitchFamily="34" charset="0"/>
+                <a:ea typeface="+mn-ea"/>
+                <a:cs typeface="Segoe UI" panose="020B0502040204020203" pitchFamily="34" charset="0"/>
+              </a:rPr>
+              <a:t>studyName</a:t>
+            </a:r>
+            <a:r>
+              <a:rPr kumimoji="0" lang="en-US" sz="1400" b="0" i="0" u="none" strike="noStrike" kern="1200" cap="none" spc="0" normalizeH="0" baseline="0" noProof="0" dirty="0">
+                <a:ln>
+                  <a:noFill/>
+                </a:ln>
+                <a:solidFill>
+                  <a:prstClr val="black"/>
+                </a:solidFill>
+                <a:effectLst/>
+                <a:uLnTx/>
+                <a:uFillTx/>
+                <a:latin typeface="Segoe UI" panose="020B0502040204020203" pitchFamily="34" charset="0"/>
+                <a:ea typeface="+mn-ea"/>
+                <a:cs typeface="Segoe UI" panose="020B0502040204020203" pitchFamily="34" charset="0"/>
+              </a:rPr>
+              <a:t>, </a:t>
+            </a:r>
+            <a:r>
+              <a:rPr kumimoji="0" lang="en-US" sz="1400" b="0" i="0" u="none" strike="noStrike" kern="1200" cap="none" spc="0" normalizeH="0" baseline="0" noProof="0" dirty="0" err="1">
+                <a:ln>
+                  <a:noFill/>
+                </a:ln>
+                <a:solidFill>
+                  <a:prstClr val="black"/>
+                </a:solidFill>
+                <a:effectLst/>
+                <a:uLnTx/>
+                <a:uFillTx/>
+                <a:latin typeface="Segoe UI" panose="020B0502040204020203" pitchFamily="34" charset="0"/>
+                <a:ea typeface="+mn-ea"/>
+                <a:cs typeface="Segoe UI" panose="020B0502040204020203" pitchFamily="34" charset="0"/>
+              </a:rPr>
+              <a:t>subscriptionId</a:t>
+            </a:r>
+            <a:r>
+              <a:rPr kumimoji="0" lang="en-US" sz="1400" b="0" i="0" u="none" strike="noStrike" kern="1200" cap="none" spc="0" normalizeH="0" baseline="0" noProof="0" dirty="0">
+                <a:ln>
+                  <a:noFill/>
+                </a:ln>
+                <a:solidFill>
+                  <a:prstClr val="black"/>
+                </a:solidFill>
+                <a:effectLst/>
+                <a:uLnTx/>
+                <a:uFillTx/>
+                <a:latin typeface="Segoe UI" panose="020B0502040204020203" pitchFamily="34" charset="0"/>
+                <a:ea typeface="+mn-ea"/>
+                <a:cs typeface="Segoe UI" panose="020B0502040204020203" pitchFamily="34" charset="0"/>
+              </a:rPr>
+              <a:t>, (location)</a:t>
+            </a:r>
+          </a:p>
+        </p:txBody>
+      </p:sp>
+      <p:sp>
+        <p:nvSpPr>
+          <p:cNvPr id="21" name="Title 1">
+            <a:extLst>
+              <a:ext uri="{FF2B5EF4-FFF2-40B4-BE49-F238E27FC236}">
+                <a16:creationId xmlns:a16="http://schemas.microsoft.com/office/drawing/2014/main" id="{025ED94C-96EB-45F2-8D5D-97CCCC77F984}"/>
+              </a:ext>
+            </a:extLst>
+          </p:cNvPr>
+          <p:cNvSpPr txBox="1">
+            <a:spLocks/>
+          </p:cNvSpPr>
+          <p:nvPr/>
+        </p:nvSpPr>
+        <p:spPr>
+          <a:xfrm>
+            <a:off x="285307" y="223358"/>
+            <a:ext cx="10515600" cy="854075"/>
+          </a:xfrm>
+          <a:prstGeom prst="rect">
+            <a:avLst/>
+          </a:prstGeom>
+        </p:spPr>
+        <p:txBody>
+          <a:bodyPr>
+            <a:normAutofit fontScale="90000" lnSpcReduction="10000"/>
+          </a:bodyPr>
+          <a:lstStyle>
+            <a:lvl1pPr algn="l" defTabSz="914400" rtl="0" eaLnBrk="1" latinLnBrk="0" hangingPunct="1">
+              <a:lnSpc>
+                <a:spcPct val="90000"/>
+              </a:lnSpc>
+              <a:spcBef>
+                <a:spcPct val="0"/>
+              </a:spcBef>
+              <a:buNone/>
+              <a:defRPr sz="4400" kern="1200">
+                <a:solidFill>
+                  <a:schemeClr val="tx1"/>
+                </a:solidFill>
+                <a:latin typeface="+mj-lt"/>
+                <a:ea typeface="+mj-ea"/>
+                <a:cs typeface="+mj-cs"/>
+              </a:defRPr>
+            </a:lvl1pPr>
+          </a:lstStyle>
+          <a:p>
+            <a:r>
+              <a:rPr lang="en-US" sz="4000" dirty="0">
+                <a:solidFill>
+                  <a:srgbClr val="0070C0"/>
+                </a:solidFill>
+                <a:latin typeface="Segoe UI Semibold" panose="020B0702040204020203" pitchFamily="34" charset="0"/>
+                <a:cs typeface="Segoe UI Semibold" panose="020B0702040204020203" pitchFamily="34" charset="0"/>
+              </a:rPr>
+              <a:t>Data Sandbox</a:t>
+            </a:r>
+            <a:br>
+              <a:rPr lang="en-US" sz="4000" dirty="0">
+                <a:solidFill>
+                  <a:srgbClr val="0070C0"/>
+                </a:solidFill>
+                <a:latin typeface="Segoe UI Semibold" panose="020B0702040204020203" pitchFamily="34" charset="0"/>
+                <a:cs typeface="Segoe UI Semibold" panose="020B0702040204020203" pitchFamily="34" charset="0"/>
+              </a:rPr>
+            </a:br>
+            <a:r>
+              <a:rPr lang="en-US" sz="2700" dirty="0">
+                <a:solidFill>
+                  <a:srgbClr val="0070C0"/>
+                </a:solidFill>
+                <a:latin typeface="Segoe UI Semibold" panose="020B0702040204020203" pitchFamily="34" charset="0"/>
+                <a:cs typeface="Segoe UI Semibold" panose="020B0702040204020203" pitchFamily="34" charset="0"/>
+              </a:rPr>
+              <a:t>Create a new study workflow</a:t>
+            </a:r>
+            <a:endParaRPr lang="en-US" sz="4000" dirty="0">
+              <a:solidFill>
+                <a:srgbClr val="0070C0"/>
+              </a:solidFill>
+              <a:latin typeface="Segoe UI Semibold" panose="020B0702040204020203" pitchFamily="34" charset="0"/>
+              <a:cs typeface="Segoe UI Semibold" panose="020B0702040204020203" pitchFamily="34" charset="0"/>
+            </a:endParaRPr>
+          </a:p>
+        </p:txBody>
+      </p:sp>
+    </p:spTree>
+    <p:extLst>
+      <p:ext uri="{BB962C8B-B14F-4D97-AF65-F5344CB8AC3E}">
+        <p14:creationId xmlns:p14="http://schemas.microsoft.com/office/powerpoint/2010/main" val="147977273"/>
+      </p:ext>
+    </p:extLst>
+  </p:cSld>
+  <p:clrMapOvr>
+    <a:masterClrMapping/>
+  </p:clrMapOvr>
+</p:sld>
+</file>
+
 <file path=ppt/theme/theme1.xml><?xml version="1.0" encoding="utf-8"?>
 <a:theme xmlns:a="http://schemas.openxmlformats.org/drawingml/2006/main" name="Office Theme">
   <a:themeElements>

</xml_diff>

<commit_message>
Updated designdocs to reflect deployment change.
</commit_message>
<xml_diff>
--- a/designdocs/src/diagrams_source.pptx
+++ b/designdocs/src/diagrams_source.pptx
@@ -5806,7 +5806,7 @@
           <a:p>
             <a:fld id="{01FA527B-0574-4E7E-9590-84105F067D6A}" type="datetimeFigureOut">
               <a:rPr lang="en-US" smtClean="0"/>
-              <a:t>19-Feb-19</a:t>
+              <a:t>24-Feb-19</a:t>
             </a:fld>
             <a:endParaRPr lang="en-US"/>
           </a:p>
@@ -6004,7 +6004,7 @@
           <a:p>
             <a:fld id="{01FA527B-0574-4E7E-9590-84105F067D6A}" type="datetimeFigureOut">
               <a:rPr lang="en-US" smtClean="0"/>
-              <a:t>19-Feb-19</a:t>
+              <a:t>24-Feb-19</a:t>
             </a:fld>
             <a:endParaRPr lang="en-US"/>
           </a:p>
@@ -6212,7 +6212,7 @@
           <a:p>
             <a:fld id="{01FA527B-0574-4E7E-9590-84105F067D6A}" type="datetimeFigureOut">
               <a:rPr lang="en-US" smtClean="0"/>
-              <a:t>19-Feb-19</a:t>
+              <a:t>24-Feb-19</a:t>
             </a:fld>
             <a:endParaRPr lang="en-US"/>
           </a:p>
@@ -6410,7 +6410,7 @@
           <a:p>
             <a:fld id="{01FA527B-0574-4E7E-9590-84105F067D6A}" type="datetimeFigureOut">
               <a:rPr lang="en-US" smtClean="0"/>
-              <a:t>19-Feb-19</a:t>
+              <a:t>24-Feb-19</a:t>
             </a:fld>
             <a:endParaRPr lang="en-US"/>
           </a:p>
@@ -6685,7 +6685,7 @@
           <a:p>
             <a:fld id="{01FA527B-0574-4E7E-9590-84105F067D6A}" type="datetimeFigureOut">
               <a:rPr lang="en-US" smtClean="0"/>
-              <a:t>19-Feb-19</a:t>
+              <a:t>24-Feb-19</a:t>
             </a:fld>
             <a:endParaRPr lang="en-US"/>
           </a:p>
@@ -6950,7 +6950,7 @@
           <a:p>
             <a:fld id="{01FA527B-0574-4E7E-9590-84105F067D6A}" type="datetimeFigureOut">
               <a:rPr lang="en-US" smtClean="0"/>
-              <a:t>19-Feb-19</a:t>
+              <a:t>24-Feb-19</a:t>
             </a:fld>
             <a:endParaRPr lang="en-US"/>
           </a:p>
@@ -7362,7 +7362,7 @@
           <a:p>
             <a:fld id="{01FA527B-0574-4E7E-9590-84105F067D6A}" type="datetimeFigureOut">
               <a:rPr lang="en-US" smtClean="0"/>
-              <a:t>19-Feb-19</a:t>
+              <a:t>24-Feb-19</a:t>
             </a:fld>
             <a:endParaRPr lang="en-US"/>
           </a:p>
@@ -7503,7 +7503,7 @@
           <a:p>
             <a:fld id="{01FA527B-0574-4E7E-9590-84105F067D6A}" type="datetimeFigureOut">
               <a:rPr lang="en-US" smtClean="0"/>
-              <a:t>19-Feb-19</a:t>
+              <a:t>24-Feb-19</a:t>
             </a:fld>
             <a:endParaRPr lang="en-US"/>
           </a:p>
@@ -7616,7 +7616,7 @@
           <a:p>
             <a:fld id="{01FA527B-0574-4E7E-9590-84105F067D6A}" type="datetimeFigureOut">
               <a:rPr lang="en-US" smtClean="0"/>
-              <a:t>19-Feb-19</a:t>
+              <a:t>24-Feb-19</a:t>
             </a:fld>
             <a:endParaRPr lang="en-US"/>
           </a:p>
@@ -7927,7 +7927,7 @@
           <a:p>
             <a:fld id="{01FA527B-0574-4E7E-9590-84105F067D6A}" type="datetimeFigureOut">
               <a:rPr lang="en-US" smtClean="0"/>
-              <a:t>19-Feb-19</a:t>
+              <a:t>24-Feb-19</a:t>
             </a:fld>
             <a:endParaRPr lang="en-US"/>
           </a:p>
@@ -8215,7 +8215,7 @@
           <a:p>
             <a:fld id="{01FA527B-0574-4E7E-9590-84105F067D6A}" type="datetimeFigureOut">
               <a:rPr lang="en-US" smtClean="0"/>
-              <a:t>19-Feb-19</a:t>
+              <a:t>24-Feb-19</a:t>
             </a:fld>
             <a:endParaRPr lang="en-US"/>
           </a:p>
@@ -8456,7 +8456,7 @@
           <a:p>
             <a:fld id="{01FA527B-0574-4E7E-9590-84105F067D6A}" type="datetimeFigureOut">
               <a:rPr lang="en-US" smtClean="0"/>
-              <a:t>19-Feb-19</a:t>
+              <a:t>24-Feb-19</a:t>
             </a:fld>
             <a:endParaRPr lang="en-US"/>
           </a:p>
@@ -18701,7 +18701,7 @@
                 <a:ea typeface="+mn-ea"/>
                 <a:cs typeface="Segoe UI" panose="020B0502040204020203" pitchFamily="34" charset="0"/>
               </a:rPr>
-              <a:t>(Creates a RG, storage account)</a:t>
+              <a:t>(Creates a storage account)</a:t>
             </a:r>
           </a:p>
         </p:txBody>
@@ -19449,8 +19449,8 @@
         </p:blipFill>
         <p:spPr>
           <a:xfrm>
-            <a:off x="3955504" y="5126131"/>
-            <a:ext cx="457178" cy="457178"/>
+            <a:off x="7979829" y="1643183"/>
+            <a:ext cx="307777" cy="307777"/>
           </a:xfrm>
           <a:prstGeom prst="rect">
             <a:avLst/>
@@ -19557,7 +19557,7 @@
         </p:blipFill>
         <p:spPr>
           <a:xfrm>
-            <a:off x="4571407" y="5126131"/>
+            <a:off x="5372979" y="4905497"/>
             <a:ext cx="457179" cy="457179"/>
           </a:xfrm>
           <a:prstGeom prst="rect">
@@ -19831,8 +19831,8 @@
         </p:nvSpPr>
         <p:spPr>
           <a:xfrm>
-            <a:off x="6558904" y="2258949"/>
-            <a:ext cx="646331" cy="276999"/>
+            <a:off x="6412605" y="2273564"/>
+            <a:ext cx="1567224" cy="276999"/>
           </a:xfrm>
           <a:prstGeom prst="rect">
             <a:avLst/>
@@ -19877,7 +19877,7 @@
                 <a:ea typeface="+mn-ea"/>
                 <a:cs typeface="Segoe UI" panose="020B0502040204020203" pitchFamily="34" charset="0"/>
               </a:rPr>
-              <a:t>deploy</a:t>
+              <a:t>Deploy the template</a:t>
             </a:r>
           </a:p>
         </p:txBody>
@@ -20010,7 +20010,7 @@
                 <a:ea typeface="+mn-ea"/>
                 <a:cs typeface="Segoe UI" panose="020B0502040204020203" pitchFamily="34" charset="0"/>
               </a:rPr>
-              <a:t>, (location)</a:t>
+              <a:t>, location</a:t>
             </a:r>
           </a:p>
         </p:txBody>
@@ -20098,6 +20098,112 @@
               <a:latin typeface="Segoe UI Semibold" panose="020B0702040204020203" pitchFamily="34" charset="0"/>
               <a:cs typeface="Segoe UI Semibold" panose="020B0702040204020203" pitchFamily="34" charset="0"/>
             </a:endParaRPr>
+          </a:p>
+        </p:txBody>
+      </p:sp>
+      <p:cxnSp>
+        <p:nvCxnSpPr>
+          <p:cNvPr id="23" name="Straight Arrow Connector 22">
+            <a:extLst>
+              <a:ext uri="{FF2B5EF4-FFF2-40B4-BE49-F238E27FC236}">
+                <a16:creationId xmlns:a16="http://schemas.microsoft.com/office/drawing/2014/main" id="{86817EC6-8FB4-4540-BB91-546C60F729D0}"/>
+              </a:ext>
+            </a:extLst>
+          </p:cNvPr>
+          <p:cNvCxnSpPr>
+            <a:cxnSpLocks/>
+          </p:cNvCxnSpPr>
+          <p:nvPr/>
+        </p:nvCxnSpPr>
+        <p:spPr>
+          <a:xfrm>
+            <a:off x="5830157" y="1808831"/>
+            <a:ext cx="2676192" cy="0"/>
+          </a:xfrm>
+          <a:prstGeom prst="straightConnector1">
+            <a:avLst/>
+          </a:prstGeom>
+          <a:ln>
+            <a:tailEnd type="triangle"/>
+          </a:ln>
+        </p:spPr>
+        <p:style>
+          <a:lnRef idx="3">
+            <a:schemeClr val="accent6"/>
+          </a:lnRef>
+          <a:fillRef idx="0">
+            <a:schemeClr val="accent6"/>
+          </a:fillRef>
+          <a:effectRef idx="2">
+            <a:schemeClr val="accent6"/>
+          </a:effectRef>
+          <a:fontRef idx="minor">
+            <a:schemeClr val="tx1"/>
+          </a:fontRef>
+        </p:style>
+      </p:cxnSp>
+      <p:sp>
+        <p:nvSpPr>
+          <p:cNvPr id="25" name="TextBox 24">
+            <a:extLst>
+              <a:ext uri="{FF2B5EF4-FFF2-40B4-BE49-F238E27FC236}">
+                <a16:creationId xmlns:a16="http://schemas.microsoft.com/office/drawing/2014/main" id="{9A72EEBE-7C75-4484-BDF0-08270BE1DD66}"/>
+              </a:ext>
+            </a:extLst>
+          </p:cNvPr>
+          <p:cNvSpPr txBox="1"/>
+          <p:nvPr/>
+        </p:nvSpPr>
+        <p:spPr>
+          <a:xfrm>
+            <a:off x="6143253" y="1825540"/>
+            <a:ext cx="1857753" cy="276999"/>
+          </a:xfrm>
+          <a:prstGeom prst="rect">
+            <a:avLst/>
+          </a:prstGeom>
+          <a:noFill/>
+        </p:spPr>
+        <p:txBody>
+          <a:bodyPr wrap="none" rtlCol="0">
+            <a:spAutoFit/>
+          </a:bodyPr>
+          <a:lstStyle/>
+          <a:p>
+            <a:pPr marL="0" marR="0" lvl="0" indent="0" algn="ctr" defTabSz="914400" rtl="0" eaLnBrk="1" fontAlgn="auto" latinLnBrk="0" hangingPunct="1">
+              <a:lnSpc>
+                <a:spcPct val="100000"/>
+              </a:lnSpc>
+              <a:spcBef>
+                <a:spcPts val="0"/>
+              </a:spcBef>
+              <a:spcAft>
+                <a:spcPts val="0"/>
+              </a:spcAft>
+              <a:buClrTx/>
+              <a:buSzTx/>
+              <a:buFontTx/>
+              <a:buNone/>
+              <a:tabLst/>
+              <a:defRPr/>
+            </a:pPr>
+            <a:r>
+              <a:rPr kumimoji="0" lang="en-US" sz="1200" b="0" i="0" u="none" strike="noStrike" kern="1200" cap="none" spc="0" normalizeH="0" baseline="0" noProof="0" dirty="0">
+                <a:ln>
+                  <a:noFill/>
+                </a:ln>
+                <a:solidFill>
+                  <a:srgbClr val="70AD47"/>
+                </a:solidFill>
+                <a:effectLst/>
+                <a:uLnTx/>
+                <a:uFillTx/>
+                <a:latin typeface="Segoe UI" panose="020B0502040204020203" pitchFamily="34" charset="0"/>
+                <a:ea typeface="+mn-ea"/>
+                <a:cs typeface="Segoe UI" panose="020B0502040204020203" pitchFamily="34" charset="0"/>
+              </a:rPr>
+              <a:t>Create a Resource Group</a:t>
+            </a:r>
           </a:p>
         </p:txBody>
       </p:sp>

</xml_diff>